<commit_message>
Did more on presentation. Added photos - Jason
</commit_message>
<xml_diff>
--- a/Presentation Material/FRI Poster.pptx
+++ b/Presentation Material/FRI Poster.pptx
@@ -2499,14 +2499,20 @@
               </a:spcBef>
             </a:pPr>
             <a:r>
-              <a:rPr lang="en-US" sz="4000" dirty="0">
+              <a:rPr lang="en-US" sz="4000" dirty="0" smtClean="0">
                 <a:solidFill>
                   <a:schemeClr val="bg1"/>
                 </a:solidFill>
                 <a:latin typeface="Arial" charset="0"/>
               </a:rPr>
-              <a:t>Association or meeting title</a:t>
-            </a:r>
+              <a:t>Freshman Research Initiative Symposium</a:t>
+            </a:r>
+            <a:endParaRPr lang="en-US" sz="4000" dirty="0">
+              <a:solidFill>
+                <a:schemeClr val="bg1"/>
+              </a:solidFill>
+              <a:latin typeface="Arial" charset="0"/>
+            </a:endParaRPr>
           </a:p>
           <a:p>
             <a:pPr marL="228600" lvl="2">
@@ -2617,8 +2623,8 @@
         </p:nvSpPr>
         <p:spPr bwMode="auto">
           <a:xfrm>
-            <a:off x="1447800" y="31789688"/>
-            <a:ext cx="14630400" cy="366712"/>
+            <a:off x="1447800" y="32003999"/>
+            <a:ext cx="29641800" cy="507831"/>
           </a:xfrm>
           <a:prstGeom prst="rect">
             <a:avLst/>
@@ -2633,7 +2639,7 @@
           <a:effectLst/>
         </p:spPr>
         <p:txBody>
-          <a:bodyPr>
+          <a:bodyPr wrap="square">
             <a:spAutoFit/>
           </a:bodyPr>
           <a:lstStyle/>
@@ -2647,15 +2653,15 @@
               </a:spcBef>
             </a:pPr>
             <a:r>
-              <a:rPr lang="en-US">
+              <a:rPr lang="en-US" sz="3600" dirty="0" smtClean="0">
                 <a:solidFill>
                   <a:schemeClr val="bg1"/>
                 </a:solidFill>
                 <a:latin typeface="Arial" charset="0"/>
               </a:rPr>
-              <a:t>Acknowledgements</a:t>
-            </a:r>
-            <a:endParaRPr lang="en-US" sz="4800">
+              <a:t>We would like to thank: The Electronics and Technology Group at Iowa State University and the Howard Hughes Medical Institute </a:t>
+            </a:r>
+            <a:endParaRPr lang="en-US" sz="3600" dirty="0">
               <a:solidFill>
                 <a:schemeClr val="bg1"/>
               </a:solidFill>
@@ -2718,8 +2724,8 @@
         </p:nvSpPr>
         <p:spPr bwMode="auto">
           <a:xfrm>
-            <a:off x="1752600" y="8001000"/>
-            <a:ext cx="8229600" cy="701675"/>
+            <a:off x="1597025" y="19096306"/>
+            <a:ext cx="8229600" cy="1323439"/>
           </a:xfrm>
           <a:prstGeom prst="rect">
             <a:avLst/>
@@ -2745,9 +2751,340 @@
               </a:spcBef>
             </a:pPr>
             <a:r>
+              <a:rPr lang="en-US" sz="8000" dirty="0" smtClean="0"/>
+              <a:t>Results</a:t>
+            </a:r>
+            <a:endParaRPr lang="en-US" sz="8000" dirty="0"/>
+          </a:p>
+        </p:txBody>
+      </p:sp>
+      <p:sp>
+        <p:nvSpPr>
+          <p:cNvPr id="4" name="TextBox 3"/>
+          <p:cNvSpPr txBox="1"/>
+          <p:nvPr/>
+        </p:nvSpPr>
+        <p:spPr>
+          <a:xfrm>
+            <a:off x="1543050" y="7892513"/>
+            <a:ext cx="8229600" cy="1323439"/>
+          </a:xfrm>
+          <a:prstGeom prst="rect">
+            <a:avLst/>
+          </a:prstGeom>
+          <a:noFill/>
+        </p:spPr>
+        <p:txBody>
+          <a:bodyPr wrap="square" rtlCol="0">
+            <a:spAutoFit/>
+          </a:bodyPr>
+          <a:lstStyle/>
+          <a:p>
+            <a:pPr algn="l"/>
+            <a:r>
+              <a:rPr lang="en-US" sz="8000" dirty="0" smtClean="0"/>
+              <a:t>Abstract</a:t>
+            </a:r>
+            <a:endParaRPr lang="en-US" sz="8000" dirty="0"/>
+          </a:p>
+        </p:txBody>
+      </p:sp>
+      <p:sp>
+        <p:nvSpPr>
+          <p:cNvPr id="5" name="TextBox 4"/>
+          <p:cNvSpPr txBox="1"/>
+          <p:nvPr/>
+        </p:nvSpPr>
+        <p:spPr>
+          <a:xfrm>
+            <a:off x="13487400" y="7892513"/>
+            <a:ext cx="6553200" cy="1323439"/>
+          </a:xfrm>
+          <a:prstGeom prst="rect">
+            <a:avLst/>
+          </a:prstGeom>
+          <a:noFill/>
+        </p:spPr>
+        <p:txBody>
+          <a:bodyPr wrap="square" rtlCol="0">
+            <a:spAutoFit/>
+          </a:bodyPr>
+          <a:lstStyle/>
+          <a:p>
+            <a:pPr algn="l"/>
+            <a:r>
+              <a:rPr lang="en-US" sz="8000" dirty="0" smtClean="0"/>
+              <a:t>Methods</a:t>
+            </a:r>
+            <a:endParaRPr lang="en-US" sz="8000" dirty="0"/>
+          </a:p>
+        </p:txBody>
+      </p:sp>
+      <p:sp>
+        <p:nvSpPr>
+          <p:cNvPr id="6" name="TextBox 5"/>
+          <p:cNvSpPr txBox="1"/>
+          <p:nvPr/>
+        </p:nvSpPr>
+        <p:spPr>
+          <a:xfrm>
+            <a:off x="33477567" y="7892513"/>
+            <a:ext cx="5943600" cy="1323439"/>
+          </a:xfrm>
+          <a:prstGeom prst="rect">
+            <a:avLst/>
+          </a:prstGeom>
+          <a:noFill/>
+        </p:spPr>
+        <p:txBody>
+          <a:bodyPr wrap="square" rtlCol="0">
+            <a:spAutoFit/>
+          </a:bodyPr>
+          <a:lstStyle/>
+          <a:p>
+            <a:pPr algn="l"/>
+            <a:r>
+              <a:rPr lang="en-US" sz="8000" dirty="0" smtClean="0"/>
+              <a:t>Conclusions</a:t>
+            </a:r>
+            <a:endParaRPr lang="en-US" sz="8000" dirty="0"/>
+          </a:p>
+        </p:txBody>
+      </p:sp>
+      <p:sp>
+        <p:nvSpPr>
+          <p:cNvPr id="8" name="TextBox 7"/>
+          <p:cNvSpPr txBox="1"/>
+          <p:nvPr/>
+        </p:nvSpPr>
+        <p:spPr>
+          <a:xfrm>
+            <a:off x="1597025" y="28480822"/>
+            <a:ext cx="5257800" cy="1323439"/>
+          </a:xfrm>
+          <a:prstGeom prst="rect">
+            <a:avLst/>
+          </a:prstGeom>
+          <a:noFill/>
+        </p:spPr>
+        <p:txBody>
+          <a:bodyPr wrap="square" rtlCol="0">
+            <a:spAutoFit/>
+          </a:bodyPr>
+          <a:lstStyle/>
+          <a:p>
+            <a:pPr algn="l"/>
+            <a:r>
+              <a:rPr lang="en-US" sz="8000" dirty="0" smtClean="0"/>
+              <a:t>Citation</a:t>
+            </a:r>
+            <a:endParaRPr lang="en-US" sz="8000" dirty="0"/>
+          </a:p>
+        </p:txBody>
+      </p:sp>
+      <p:sp>
+        <p:nvSpPr>
+          <p:cNvPr id="9" name="TextBox 8"/>
+          <p:cNvSpPr txBox="1"/>
+          <p:nvPr/>
+        </p:nvSpPr>
+        <p:spPr>
+          <a:xfrm>
+            <a:off x="1597025" y="29804261"/>
+            <a:ext cx="22094458" cy="1938992"/>
+          </a:xfrm>
+          <a:prstGeom prst="rect">
+            <a:avLst/>
+          </a:prstGeom>
+          <a:noFill/>
+        </p:spPr>
+        <p:txBody>
+          <a:bodyPr wrap="square" rtlCol="0">
+            <a:spAutoFit/>
+          </a:bodyPr>
+          <a:lstStyle/>
+          <a:p>
+            <a:pPr algn="l"/>
+            <a:r>
               <a:rPr lang="en-US" sz="4000" dirty="0"/>
-              <a:t>Content</a:t>
-            </a:r>
+              <a:t>S, Mehdi . "Music, Magic and Mayhem with Tesla Coil." </a:t>
+            </a:r>
+            <a:r>
+              <a:rPr lang="en-US" sz="4000" dirty="0" err="1"/>
+              <a:t>ElectroBoom</a:t>
+            </a:r>
+            <a:r>
+              <a:rPr lang="en-US" sz="4000" dirty="0"/>
+              <a:t>. May 26, 2015. Accessed April 09, </a:t>
+            </a:r>
+          </a:p>
+          <a:p>
+            <a:pPr algn="l"/>
+            <a:r>
+              <a:rPr lang="en-US" sz="4000" dirty="0"/>
+              <a:t>        2017. http://www.electroboom.com/?p=575.</a:t>
+            </a:r>
+          </a:p>
+          <a:p>
+            <a:pPr algn="l"/>
+            <a:endParaRPr lang="en-US" sz="4000" dirty="0"/>
+          </a:p>
+        </p:txBody>
+      </p:sp>
+      <p:sp>
+        <p:nvSpPr>
+          <p:cNvPr id="10" name="TextBox 9"/>
+          <p:cNvSpPr txBox="1"/>
+          <p:nvPr/>
+        </p:nvSpPr>
+        <p:spPr>
+          <a:xfrm>
+            <a:off x="1597025" y="9481601"/>
+            <a:ext cx="10366375" cy="8094524"/>
+          </a:xfrm>
+          <a:prstGeom prst="rect">
+            <a:avLst/>
+          </a:prstGeom>
+          <a:noFill/>
+        </p:spPr>
+        <p:txBody>
+          <a:bodyPr wrap="square" rtlCol="0">
+            <a:spAutoFit/>
+          </a:bodyPr>
+          <a:lstStyle/>
+          <a:p>
+            <a:pPr algn="l"/>
+            <a:r>
+              <a:rPr lang="en-US" sz="4000" dirty="0"/>
+              <a:t>To research and learn about generating high voltage frequency and converting high frequency electromagnetic fields into useable energy. In doing this, we explore the field of wireless energy transfer, a well known idea recognized around the world, yet not fully explored. By exploring this, we hope to understand how to implement the technology into daily lives of people. With this research idea, we can create a new way to distribute energy to large areas, power electronics, charge batteries, and </a:t>
+            </a:r>
+            <a:r>
+              <a:rPr lang="en-US" sz="4000" dirty="0" smtClean="0"/>
+              <a:t>make this technology as commonplace as plugs and sockets are today.</a:t>
+            </a:r>
+            <a:endParaRPr lang="en-US" sz="4000" dirty="0"/>
+          </a:p>
+        </p:txBody>
+      </p:sp>
+      <p:pic>
+        <p:nvPicPr>
+          <p:cNvPr id="11" name="Picture 10"/>
+          <p:cNvPicPr>
+            <a:picLocks noChangeAspect="1"/>
+          </p:cNvPicPr>
+          <p:nvPr/>
+        </p:nvPicPr>
+        <p:blipFill>
+          <a:blip r:embed="rId2" cstate="print">
+            <a:extLst>
+              <a:ext uri="{28A0092B-C50C-407E-A947-70E740481C1C}">
+                <a14:useLocalDpi xmlns:a14="http://schemas.microsoft.com/office/drawing/2010/main" val="0"/>
+              </a:ext>
+            </a:extLst>
+          </a:blip>
+          <a:stretch>
+            <a:fillRect/>
+          </a:stretch>
+        </p:blipFill>
+        <p:spPr>
+          <a:xfrm>
+            <a:off x="6934200" y="20419745"/>
+            <a:ext cx="10058400" cy="7543800"/>
+          </a:xfrm>
+          <a:prstGeom prst="rect">
+            <a:avLst/>
+          </a:prstGeom>
+        </p:spPr>
+      </p:pic>
+      <p:pic>
+        <p:nvPicPr>
+          <p:cNvPr id="15" name="Picture 14"/>
+          <p:cNvPicPr>
+            <a:picLocks noChangeAspect="1"/>
+          </p:cNvPicPr>
+          <p:nvPr/>
+        </p:nvPicPr>
+        <p:blipFill>
+          <a:blip r:embed="rId3">
+            <a:extLst>
+              <a:ext uri="{28A0092B-C50C-407E-A947-70E740481C1C}">
+                <a14:useLocalDpi xmlns:a14="http://schemas.microsoft.com/office/drawing/2010/main" val="0"/>
+              </a:ext>
+            </a:extLst>
+          </a:blip>
+          <a:stretch>
+            <a:fillRect/>
+          </a:stretch>
+        </p:blipFill>
+        <p:spPr>
+          <a:xfrm>
+            <a:off x="20669250" y="12356316"/>
+            <a:ext cx="10420350" cy="8231601"/>
+          </a:xfrm>
+          <a:prstGeom prst="rect">
+            <a:avLst/>
+          </a:prstGeom>
+        </p:spPr>
+      </p:pic>
+      <p:sp>
+        <p:nvSpPr>
+          <p:cNvPr id="16" name="TextBox 15"/>
+          <p:cNvSpPr txBox="1"/>
+          <p:nvPr/>
+        </p:nvSpPr>
+        <p:spPr>
+          <a:xfrm>
+            <a:off x="20669250" y="11771541"/>
+            <a:ext cx="10420350" cy="584775"/>
+          </a:xfrm>
+          <a:prstGeom prst="rect">
+            <a:avLst/>
+          </a:prstGeom>
+          <a:noFill/>
+        </p:spPr>
+        <p:txBody>
+          <a:bodyPr wrap="square" rtlCol="0">
+            <a:spAutoFit/>
+          </a:bodyPr>
+          <a:lstStyle/>
+          <a:p>
+            <a:pPr algn="l"/>
+            <a:r>
+              <a:rPr lang="en-US" sz="3200" dirty="0" smtClean="0"/>
+              <a:t>Figure 1: Custom Schematic drawn for project</a:t>
+            </a:r>
+            <a:endParaRPr lang="en-US" sz="3200" dirty="0"/>
+          </a:p>
+        </p:txBody>
+      </p:sp>
+      <p:sp>
+        <p:nvSpPr>
+          <p:cNvPr id="17" name="TextBox 16"/>
+          <p:cNvSpPr txBox="1"/>
+          <p:nvPr/>
+        </p:nvSpPr>
+        <p:spPr>
+          <a:xfrm>
+            <a:off x="13487400" y="9211818"/>
+            <a:ext cx="17602200" cy="2554545"/>
+          </a:xfrm>
+          <a:prstGeom prst="rect">
+            <a:avLst/>
+          </a:prstGeom>
+          <a:noFill/>
+        </p:spPr>
+        <p:txBody>
+          <a:bodyPr wrap="square" rtlCol="0">
+            <a:spAutoFit/>
+          </a:bodyPr>
+          <a:lstStyle/>
+          <a:p>
+            <a:pPr algn="l"/>
+            <a:r>
+              <a:rPr lang="en-US" sz="4000" dirty="0" smtClean="0"/>
+              <a:t>To explore wireless energy transmission, a tunable Tesla Coil was designed and built. To accomplish the goals we had for tunable signals, we designed a Printed Circuit Board (PCB) that allows for 2 inputs of 12 volts and outputs 12 volts to run the Tesla Coil and a signal to control it. </a:t>
+            </a:r>
+            <a:endParaRPr lang="en-US" sz="4000" dirty="0"/>
           </a:p>
         </p:txBody>
       </p:sp>

</xml_diff>